<commit_message>
Add ideas from my sweetheart :)
</commit_message>
<xml_diff>
--- a/presentation.pptx
+++ b/presentation.pptx
@@ -197,7 +197,7 @@
 <file path=ppt/revisionInfo.xml><?xml version="1.0" encoding="utf-8"?>
 <p1510:revInfo xmlns:a="http://schemas.openxmlformats.org/drawingml/2006/main" xmlns:r="http://schemas.openxmlformats.org/officeDocument/2006/relationships" xmlns:p1510="http://schemas.microsoft.com/office/powerpoint/2015/10/main">
   <p1510:revLst>
-    <p1510:client id="{1670CD84-DEE0-4E12-BF01-4C2D0C1D7F30}" v="846" dt="2024-06-08T15:15:22.466"/>
+    <p1510:client id="{1670CD84-DEE0-4E12-BF01-4C2D0C1D7F30}" v="867" dt="2024-06-14T14:10:26.656"/>
   </p1510:revLst>
 </p1510:revInfo>
 </file>
@@ -207,7 +207,7 @@
   <pc:docChgLst>
     <pc:chgData name="Dominique RIGHETTO" userId="512fe077-82ad-424c-88a3-15e852b5861d" providerId="ADAL" clId="{1670CD84-DEE0-4E12-BF01-4C2D0C1D7F30}"/>
     <pc:docChg chg="undo custSel addSld delSld modSld sldOrd">
-      <pc:chgData name="Dominique RIGHETTO" userId="512fe077-82ad-424c-88a3-15e852b5861d" providerId="ADAL" clId="{1670CD84-DEE0-4E12-BF01-4C2D0C1D7F30}" dt="2024-06-12T15:09:00.251" v="12016" actId="115"/>
+      <pc:chgData name="Dominique RIGHETTO" userId="512fe077-82ad-424c-88a3-15e852b5861d" providerId="ADAL" clId="{1670CD84-DEE0-4E12-BF01-4C2D0C1D7F30}" dt="2024-06-14T14:10:31.892" v="12217" actId="14100"/>
       <pc:docMkLst>
         <pc:docMk/>
       </pc:docMkLst>
@@ -476,12 +476,20 @@
           </ac:picMkLst>
         </pc:picChg>
       </pc:sldChg>
-      <pc:sldChg chg="modSp add mod modTransition">
-        <pc:chgData name="Dominique RIGHETTO" userId="512fe077-82ad-424c-88a3-15e852b5861d" providerId="ADAL" clId="{1670CD84-DEE0-4E12-BF01-4C2D0C1D7F30}" dt="2024-05-19T07:43:48.638" v="11068"/>
+      <pc:sldChg chg="addSp delSp modSp add mod modTransition">
+        <pc:chgData name="Dominique RIGHETTO" userId="512fe077-82ad-424c-88a3-15e852b5861d" providerId="ADAL" clId="{1670CD84-DEE0-4E12-BF01-4C2D0C1D7F30}" dt="2024-06-14T14:02:44.121" v="12061" actId="21"/>
         <pc:sldMkLst>
           <pc:docMk/>
           <pc:sldMk cId="2371800147" sldId="267"/>
         </pc:sldMkLst>
+        <pc:spChg chg="add del mod">
+          <ac:chgData name="Dominique RIGHETTO" userId="512fe077-82ad-424c-88a3-15e852b5861d" providerId="ADAL" clId="{1670CD84-DEE0-4E12-BF01-4C2D0C1D7F30}" dt="2024-06-14T14:02:44.121" v="12061" actId="21"/>
+          <ac:spMkLst>
+            <pc:docMk/>
+            <pc:sldMk cId="2371800147" sldId="267"/>
+            <ac:spMk id="3" creationId="{17FD2C3B-1381-A17A-4A57-909F02E90E2B}"/>
+          </ac:spMkLst>
+        </pc:spChg>
         <pc:spChg chg="mod">
           <ac:chgData name="Dominique RIGHETTO" userId="512fe077-82ad-424c-88a3-15e852b5861d" providerId="ADAL" clId="{1670CD84-DEE0-4E12-BF01-4C2D0C1D7F30}" dt="2024-05-19T07:43:48.638" v="11068"/>
           <ac:spMkLst>
@@ -1135,7 +1143,7 @@
         </pc:spChg>
       </pc:sldChg>
       <pc:sldChg chg="addSp delSp modSp add mod ord modTransition">
-        <pc:chgData name="Dominique RIGHETTO" userId="512fe077-82ad-424c-88a3-15e852b5861d" providerId="ADAL" clId="{1670CD84-DEE0-4E12-BF01-4C2D0C1D7F30}" dt="2024-05-26T07:41:54.368" v="11848" actId="11530"/>
+        <pc:chgData name="Dominique RIGHETTO" userId="512fe077-82ad-424c-88a3-15e852b5861d" providerId="ADAL" clId="{1670CD84-DEE0-4E12-BF01-4C2D0C1D7F30}" dt="2024-06-14T14:03:53.427" v="12138" actId="21"/>
         <pc:sldMkLst>
           <pc:docMk/>
           <pc:sldMk cId="1960651900" sldId="281"/>
@@ -1146,6 +1154,14 @@
             <pc:docMk/>
             <pc:sldMk cId="1960651900" sldId="281"/>
             <ac:spMk id="2" creationId="{5CE54ABB-4929-4810-950B-2DAEA0A5BAB4}"/>
+          </ac:spMkLst>
+        </pc:spChg>
+        <pc:spChg chg="add del mod">
+          <ac:chgData name="Dominique RIGHETTO" userId="512fe077-82ad-424c-88a3-15e852b5861d" providerId="ADAL" clId="{1670CD84-DEE0-4E12-BF01-4C2D0C1D7F30}" dt="2024-06-14T14:03:53.427" v="12138" actId="21"/>
+          <ac:spMkLst>
+            <pc:docMk/>
+            <pc:sldMk cId="1960651900" sldId="281"/>
+            <ac:spMk id="3" creationId="{17FD2C3B-1381-A17A-4A57-909F02E90E2B}"/>
           </ac:spMkLst>
         </pc:spChg>
         <pc:spChg chg="del">
@@ -1401,7 +1417,7 @@
         </pc:picChg>
       </pc:sldChg>
       <pc:sldChg chg="addSp delSp modSp add mod ord modTransition">
-        <pc:chgData name="Dominique RIGHETTO" userId="512fe077-82ad-424c-88a3-15e852b5861d" providerId="ADAL" clId="{1670CD84-DEE0-4E12-BF01-4C2D0C1D7F30}" dt="2024-05-19T07:49:43.144" v="11122" actId="20577"/>
+        <pc:chgData name="Dominique RIGHETTO" userId="512fe077-82ad-424c-88a3-15e852b5861d" providerId="ADAL" clId="{1670CD84-DEE0-4E12-BF01-4C2D0C1D7F30}" dt="2024-06-14T14:03:58.618" v="12139"/>
         <pc:sldMkLst>
           <pc:docMk/>
           <pc:sldMk cId="27853575" sldId="285"/>
@@ -1412,6 +1428,14 @@
             <pc:docMk/>
             <pc:sldMk cId="27853575" sldId="285"/>
             <ac:spMk id="2" creationId="{5CE54ABB-4929-4810-950B-2DAEA0A5BAB4}"/>
+          </ac:spMkLst>
+        </pc:spChg>
+        <pc:spChg chg="add mod">
+          <ac:chgData name="Dominique RIGHETTO" userId="512fe077-82ad-424c-88a3-15e852b5861d" providerId="ADAL" clId="{1670CD84-DEE0-4E12-BF01-4C2D0C1D7F30}" dt="2024-06-14T14:03:58.618" v="12139"/>
+          <ac:spMkLst>
+            <pc:docMk/>
+            <pc:sldMk cId="27853575" sldId="285"/>
+            <ac:spMk id="3" creationId="{17FD2C3B-1381-A17A-4A57-909F02E90E2B}"/>
           </ac:spMkLst>
         </pc:spChg>
         <pc:spChg chg="add del mod">
@@ -1905,7 +1929,7 @@
         </pc:picChg>
       </pc:sldChg>
       <pc:sldChg chg="addSp delSp modSp add mod modTransition">
-        <pc:chgData name="Dominique RIGHETTO" userId="512fe077-82ad-424c-88a3-15e852b5861d" providerId="ADAL" clId="{1670CD84-DEE0-4E12-BF01-4C2D0C1D7F30}" dt="2024-05-26T07:40:10.307" v="11829" actId="11530"/>
+        <pc:chgData name="Dominique RIGHETTO" userId="512fe077-82ad-424c-88a3-15e852b5861d" providerId="ADAL" clId="{1670CD84-DEE0-4E12-BF01-4C2D0C1D7F30}" dt="2024-06-14T14:04:30.989" v="12142" actId="20577"/>
         <pc:sldMkLst>
           <pc:docMk/>
           <pc:sldMk cId="773976246" sldId="296"/>
@@ -1940,6 +1964,14 @@
             <pc:docMk/>
             <pc:sldMk cId="773976246" sldId="296"/>
             <ac:spMk id="4" creationId="{E004E72C-2BAE-E53D-D238-DF0D3277F87A}"/>
+          </ac:spMkLst>
+        </pc:spChg>
+        <pc:spChg chg="add mod">
+          <ac:chgData name="Dominique RIGHETTO" userId="512fe077-82ad-424c-88a3-15e852b5861d" providerId="ADAL" clId="{1670CD84-DEE0-4E12-BF01-4C2D0C1D7F30}" dt="2024-06-14T14:04:30.989" v="12142" actId="20577"/>
+          <ac:spMkLst>
+            <pc:docMk/>
+            <pc:sldMk cId="773976246" sldId="296"/>
+            <ac:spMk id="5" creationId="{87DB41D6-A82F-73BC-3C8F-33EB463D8E05}"/>
           </ac:spMkLst>
         </pc:spChg>
         <pc:spChg chg="mod">
@@ -2156,7 +2188,7 @@
         </pc:picChg>
       </pc:sldChg>
       <pc:sldChg chg="addSp modSp add mod ord modTransition modNotesTx">
-        <pc:chgData name="Dominique RIGHETTO" userId="512fe077-82ad-424c-88a3-15e852b5861d" providerId="ADAL" clId="{1670CD84-DEE0-4E12-BF01-4C2D0C1D7F30}" dt="2024-06-12T15:09:00.251" v="12016" actId="115"/>
+        <pc:chgData name="Dominique RIGHETTO" userId="512fe077-82ad-424c-88a3-15e852b5861d" providerId="ADAL" clId="{1670CD84-DEE0-4E12-BF01-4C2D0C1D7F30}" dt="2024-06-14T14:04:47.569" v="12145" actId="20577"/>
         <pc:sldMkLst>
           <pc:docMk/>
           <pc:sldMk cId="2624687999" sldId="301"/>
@@ -2183,6 +2215,14 @@
             <pc:docMk/>
             <pc:sldMk cId="2624687999" sldId="301"/>
             <ac:spMk id="4" creationId="{3AE8B725-1354-7EBF-492D-DF621411B45B}"/>
+          </ac:spMkLst>
+        </pc:spChg>
+        <pc:spChg chg="add mod">
+          <ac:chgData name="Dominique RIGHETTO" userId="512fe077-82ad-424c-88a3-15e852b5861d" providerId="ADAL" clId="{1670CD84-DEE0-4E12-BF01-4C2D0C1D7F30}" dt="2024-06-14T14:04:47.569" v="12145" actId="20577"/>
+          <ac:spMkLst>
+            <pc:docMk/>
+            <pc:sldMk cId="2624687999" sldId="301"/>
+            <ac:spMk id="5" creationId="{EA7CF4AC-5C2B-26B1-43A6-40E8D6586B0E}"/>
           </ac:spMkLst>
         </pc:spChg>
         <pc:spChg chg="mod">
@@ -2604,8 +2644,8 @@
           </ac:picMkLst>
         </pc:picChg>
       </pc:sldChg>
-      <pc:sldChg chg="delSp modSp add mod modTransition">
-        <pc:chgData name="Dominique RIGHETTO" userId="512fe077-82ad-424c-88a3-15e852b5861d" providerId="ADAL" clId="{1670CD84-DEE0-4E12-BF01-4C2D0C1D7F30}" dt="2024-05-20T07:03:14.595" v="11368" actId="20577"/>
+      <pc:sldChg chg="addSp delSp modSp add mod modTransition">
+        <pc:chgData name="Dominique RIGHETTO" userId="512fe077-82ad-424c-88a3-15e852b5861d" providerId="ADAL" clId="{1670CD84-DEE0-4E12-BF01-4C2D0C1D7F30}" dt="2024-06-14T14:08:59.894" v="12195"/>
         <pc:sldMkLst>
           <pc:docMk/>
           <pc:sldMk cId="2485501603" sldId="308"/>
@@ -2618,8 +2658,16 @@
             <ac:spMk id="2" creationId="{5CE54ABB-4929-4810-950B-2DAEA0A5BAB4}"/>
           </ac:spMkLst>
         </pc:spChg>
+        <pc:spChg chg="add mod">
+          <ac:chgData name="Dominique RIGHETTO" userId="512fe077-82ad-424c-88a3-15e852b5861d" providerId="ADAL" clId="{1670CD84-DEE0-4E12-BF01-4C2D0C1D7F30}" dt="2024-06-14T14:05:42.265" v="12163" actId="20577"/>
+          <ac:spMkLst>
+            <pc:docMk/>
+            <pc:sldMk cId="2485501603" sldId="308"/>
+            <ac:spMk id="3" creationId="{15755BD8-52B2-29C6-CEC2-C1525AAB65BA}"/>
+          </ac:spMkLst>
+        </pc:spChg>
         <pc:spChg chg="mod">
-          <ac:chgData name="Dominique RIGHETTO" userId="512fe077-82ad-424c-88a3-15e852b5861d" providerId="ADAL" clId="{1670CD84-DEE0-4E12-BF01-4C2D0C1D7F30}" dt="2024-05-20T07:03:14.595" v="11368" actId="20577"/>
+          <ac:chgData name="Dominique RIGHETTO" userId="512fe077-82ad-424c-88a3-15e852b5861d" providerId="ADAL" clId="{1670CD84-DEE0-4E12-BF01-4C2D0C1D7F30}" dt="2024-06-14T14:08:59.894" v="12195"/>
           <ac:spMkLst>
             <pc:docMk/>
             <pc:sldMk cId="2485501603" sldId="308"/>
@@ -2682,13 +2730,13 @@
         </pc:picChg>
       </pc:sldChg>
       <pc:sldChg chg="addSp delSp modSp add mod ord modTransition">
-        <pc:chgData name="Dominique RIGHETTO" userId="512fe077-82ad-424c-88a3-15e852b5861d" providerId="ADAL" clId="{1670CD84-DEE0-4E12-BF01-4C2D0C1D7F30}" dt="2024-05-26T07:45:12.121" v="11870" actId="1076"/>
+        <pc:chgData name="Dominique RIGHETTO" userId="512fe077-82ad-424c-88a3-15e852b5861d" providerId="ADAL" clId="{1670CD84-DEE0-4E12-BF01-4C2D0C1D7F30}" dt="2024-06-14T14:10:31.892" v="12217" actId="14100"/>
         <pc:sldMkLst>
           <pc:docMk/>
           <pc:sldMk cId="3271207713" sldId="311"/>
         </pc:sldMkLst>
         <pc:spChg chg="mod">
-          <ac:chgData name="Dominique RIGHETTO" userId="512fe077-82ad-424c-88a3-15e852b5861d" providerId="ADAL" clId="{1670CD84-DEE0-4E12-BF01-4C2D0C1D7F30}" dt="2024-05-12T09:43:58.179" v="10870" actId="20577"/>
+          <ac:chgData name="Dominique RIGHETTO" userId="512fe077-82ad-424c-88a3-15e852b5861d" providerId="ADAL" clId="{1670CD84-DEE0-4E12-BF01-4C2D0C1D7F30}" dt="2024-06-14T14:10:31.892" v="12217" actId="14100"/>
           <ac:spMkLst>
             <pc:docMk/>
             <pc:sldMk cId="3271207713" sldId="311"/>
@@ -2712,7 +2760,7 @@
           </ac:picMkLst>
         </pc:picChg>
         <pc:picChg chg="add mod">
-          <ac:chgData name="Dominique RIGHETTO" userId="512fe077-82ad-424c-88a3-15e852b5861d" providerId="ADAL" clId="{1670CD84-DEE0-4E12-BF01-4C2D0C1D7F30}" dt="2024-05-26T07:45:12.121" v="11870" actId="1076"/>
+          <ac:chgData name="Dominique RIGHETTO" userId="512fe077-82ad-424c-88a3-15e852b5861d" providerId="ADAL" clId="{1670CD84-DEE0-4E12-BF01-4C2D0C1D7F30}" dt="2024-06-14T14:10:26.640" v="12216" actId="14100"/>
           <ac:picMkLst>
             <pc:docMk/>
             <pc:sldMk cId="3271207713" sldId="311"/>
@@ -2720,8 +2768,8 @@
           </ac:picMkLst>
         </pc:picChg>
       </pc:sldChg>
-      <pc:sldChg chg="modSp add mod ord modTransition">
-        <pc:chgData name="Dominique RIGHETTO" userId="512fe077-82ad-424c-88a3-15e852b5861d" providerId="ADAL" clId="{1670CD84-DEE0-4E12-BF01-4C2D0C1D7F30}" dt="2024-05-20T07:34:51.168" v="11701"/>
+      <pc:sldChg chg="addSp delSp modSp add mod ord modTransition">
+        <pc:chgData name="Dominique RIGHETTO" userId="512fe077-82ad-424c-88a3-15e852b5861d" providerId="ADAL" clId="{1670CD84-DEE0-4E12-BF01-4C2D0C1D7F30}" dt="2024-06-14T14:01:14.365" v="12056" actId="21"/>
         <pc:sldMkLst>
           <pc:docMk/>
           <pc:sldMk cId="2168811583" sldId="312"/>
@@ -2732,6 +2780,14 @@
             <pc:docMk/>
             <pc:sldMk cId="2168811583" sldId="312"/>
             <ac:spMk id="2" creationId="{5CE54ABB-4929-4810-950B-2DAEA0A5BAB4}"/>
+          </ac:spMkLst>
+        </pc:spChg>
+        <pc:spChg chg="add del mod">
+          <ac:chgData name="Dominique RIGHETTO" userId="512fe077-82ad-424c-88a3-15e852b5861d" providerId="ADAL" clId="{1670CD84-DEE0-4E12-BF01-4C2D0C1D7F30}" dt="2024-06-14T14:01:14.365" v="12056" actId="21"/>
+          <ac:spMkLst>
+            <pc:docMk/>
+            <pc:sldMk cId="2168811583" sldId="312"/>
+            <ac:spMk id="3" creationId="{17FD2C3B-1381-A17A-4A57-909F02E90E2B}"/>
           </ac:spMkLst>
         </pc:spChg>
         <pc:spChg chg="mod">
@@ -2751,11 +2807,19 @@
         </pc:sldMkLst>
       </pc:sldChg>
       <pc:sldChg chg="addSp delSp modSp add mod ord modTransition">
-        <pc:chgData name="Dominique RIGHETTO" userId="512fe077-82ad-424c-88a3-15e852b5861d" providerId="ADAL" clId="{1670CD84-DEE0-4E12-BF01-4C2D0C1D7F30}" dt="2024-06-08T15:15:14.057" v="11909"/>
+        <pc:chgData name="Dominique RIGHETTO" userId="512fe077-82ad-424c-88a3-15e852b5861d" providerId="ADAL" clId="{1670CD84-DEE0-4E12-BF01-4C2D0C1D7F30}" dt="2024-06-14T14:05:04.264" v="12152" actId="20577"/>
         <pc:sldMkLst>
           <pc:docMk/>
           <pc:sldMk cId="1011501238" sldId="313"/>
         </pc:sldMkLst>
+        <pc:spChg chg="add mod">
+          <ac:chgData name="Dominique RIGHETTO" userId="512fe077-82ad-424c-88a3-15e852b5861d" providerId="ADAL" clId="{1670CD84-DEE0-4E12-BF01-4C2D0C1D7F30}" dt="2024-06-14T14:05:04.264" v="12152" actId="20577"/>
+          <ac:spMkLst>
+            <pc:docMk/>
+            <pc:sldMk cId="1011501238" sldId="313"/>
+            <ac:spMk id="5" creationId="{106CEFF9-4794-F9AE-DE0F-E14646D3D772}"/>
+          </ac:spMkLst>
+        </pc:spChg>
         <pc:spChg chg="mod">
           <ac:chgData name="Dominique RIGHETTO" userId="512fe077-82ad-424c-88a3-15e852b5861d" providerId="ADAL" clId="{1670CD84-DEE0-4E12-BF01-4C2D0C1D7F30}" dt="2024-05-19T07:59:15.325" v="11183" actId="14100"/>
           <ac:spMkLst>
@@ -6192,7 +6256,7 @@
           <a:p>
             <a:fld id="{F352A77B-D33C-49B3-A83C-450AA2ED72B3}" type="datetimeFigureOut">
               <a:rPr lang="en-US" smtClean="0"/>
-              <a:t>6/12/2024</a:t>
+              <a:t>6/14/2024</a:t>
             </a:fld>
             <a:endParaRPr lang="en-US" dirty="0"/>
           </a:p>
@@ -6369,7 +6433,7 @@
           <a:p>
             <a:fld id="{E38D8F9A-F5CB-4EF8-A859-ED5E107B9763}" type="datetimeFigureOut">
               <a:rPr lang="en-US" smtClean="0"/>
-              <a:t>6/12/2024</a:t>
+              <a:t>6/14/2024</a:t>
             </a:fld>
             <a:endParaRPr lang="en-US" dirty="0"/>
           </a:p>
@@ -27029,6 +27093,58 @@
           </a:p>
         </p:txBody>
       </p:sp>
+      <p:sp>
+        <p:nvSpPr>
+          <p:cNvPr id="3" name="Rectangle 2">
+            <a:extLst>
+              <a:ext uri="{FF2B5EF4-FFF2-40B4-BE49-F238E27FC236}">
+                <a16:creationId xmlns:a16="http://schemas.microsoft.com/office/drawing/2014/main" id="{17FD2C3B-1381-A17A-4A57-909F02E90E2B}"/>
+              </a:ext>
+            </a:extLst>
+          </p:cNvPr>
+          <p:cNvSpPr/>
+          <p:nvPr/>
+        </p:nvSpPr>
+        <p:spPr>
+          <a:xfrm>
+            <a:off x="62910" y="136525"/>
+            <a:ext cx="1580539" cy="357745"/>
+          </a:xfrm>
+          <a:prstGeom prst="rect">
+            <a:avLst/>
+          </a:prstGeom>
+          <a:ln>
+            <a:noFill/>
+          </a:ln>
+        </p:spPr>
+        <p:style>
+          <a:lnRef idx="2">
+            <a:schemeClr val="accent5">
+              <a:shade val="15000"/>
+            </a:schemeClr>
+          </a:lnRef>
+          <a:fillRef idx="1">
+            <a:schemeClr val="accent5"/>
+          </a:fillRef>
+          <a:effectRef idx="0">
+            <a:schemeClr val="accent5"/>
+          </a:effectRef>
+          <a:fontRef idx="minor">
+            <a:schemeClr val="lt1"/>
+          </a:fontRef>
+        </p:style>
+        <p:txBody>
+          <a:bodyPr rtlCol="0" anchor="ctr"/>
+          <a:lstStyle/>
+          <a:p>
+            <a:pPr algn="ctr"/>
+            <a:r>
+              <a:rPr lang="en-US" dirty="0"/>
+              <a:t>🕓 01:00 P.M.</a:t>
+            </a:r>
+          </a:p>
+        </p:txBody>
+      </p:sp>
     </p:spTree>
     <p:extLst>
       <p:ext uri="{BB962C8B-B14F-4D97-AF65-F5344CB8AC3E}">
@@ -29908,6 +30024,58 @@
           </a:p>
         </p:txBody>
       </p:sp>
+      <p:sp>
+        <p:nvSpPr>
+          <p:cNvPr id="5" name="Rectangle 4">
+            <a:extLst>
+              <a:ext uri="{FF2B5EF4-FFF2-40B4-BE49-F238E27FC236}">
+                <a16:creationId xmlns:a16="http://schemas.microsoft.com/office/drawing/2014/main" id="{87DB41D6-A82F-73BC-3C8F-33EB463D8E05}"/>
+              </a:ext>
+            </a:extLst>
+          </p:cNvPr>
+          <p:cNvSpPr/>
+          <p:nvPr/>
+        </p:nvSpPr>
+        <p:spPr>
+          <a:xfrm>
+            <a:off x="62910" y="136525"/>
+            <a:ext cx="1580539" cy="357745"/>
+          </a:xfrm>
+          <a:prstGeom prst="rect">
+            <a:avLst/>
+          </a:prstGeom>
+          <a:ln>
+            <a:noFill/>
+          </a:ln>
+        </p:spPr>
+        <p:style>
+          <a:lnRef idx="2">
+            <a:schemeClr val="accent5">
+              <a:shade val="15000"/>
+            </a:schemeClr>
+          </a:lnRef>
+          <a:fillRef idx="1">
+            <a:schemeClr val="accent5"/>
+          </a:fillRef>
+          <a:effectRef idx="0">
+            <a:schemeClr val="accent5"/>
+          </a:effectRef>
+          <a:fontRef idx="minor">
+            <a:schemeClr val="lt1"/>
+          </a:fontRef>
+        </p:style>
+        <p:txBody>
+          <a:bodyPr rtlCol="0" anchor="ctr"/>
+          <a:lstStyle/>
+          <a:p>
+            <a:pPr algn="ctr"/>
+            <a:r>
+              <a:rPr lang="en-US" dirty="0"/>
+              <a:t>🕓 02:00 P.M.</a:t>
+            </a:r>
+          </a:p>
+        </p:txBody>
+      </p:sp>
     </p:spTree>
     <p:extLst>
       <p:ext uri="{BB962C8B-B14F-4D97-AF65-F5344CB8AC3E}">
@@ -31673,6 +31841,58 @@
           <a:p>
             <a:pPr algn="ctr"/>
             <a:endParaRPr lang="en-US"/>
+          </a:p>
+        </p:txBody>
+      </p:sp>
+      <p:sp>
+        <p:nvSpPr>
+          <p:cNvPr id="5" name="Rectangle 4">
+            <a:extLst>
+              <a:ext uri="{FF2B5EF4-FFF2-40B4-BE49-F238E27FC236}">
+                <a16:creationId xmlns:a16="http://schemas.microsoft.com/office/drawing/2014/main" id="{EA7CF4AC-5C2B-26B1-43A6-40E8D6586B0E}"/>
+              </a:ext>
+            </a:extLst>
+          </p:cNvPr>
+          <p:cNvSpPr/>
+          <p:nvPr/>
+        </p:nvSpPr>
+        <p:spPr>
+          <a:xfrm>
+            <a:off x="62910" y="136525"/>
+            <a:ext cx="1580539" cy="357745"/>
+          </a:xfrm>
+          <a:prstGeom prst="rect">
+            <a:avLst/>
+          </a:prstGeom>
+          <a:ln>
+            <a:noFill/>
+          </a:ln>
+        </p:spPr>
+        <p:style>
+          <a:lnRef idx="2">
+            <a:schemeClr val="accent5">
+              <a:shade val="15000"/>
+            </a:schemeClr>
+          </a:lnRef>
+          <a:fillRef idx="1">
+            <a:schemeClr val="accent5"/>
+          </a:fillRef>
+          <a:effectRef idx="0">
+            <a:schemeClr val="accent5"/>
+          </a:effectRef>
+          <a:fontRef idx="minor">
+            <a:schemeClr val="lt1"/>
+          </a:fontRef>
+        </p:style>
+        <p:txBody>
+          <a:bodyPr rtlCol="0" anchor="ctr"/>
+          <a:lstStyle/>
+          <a:p>
+            <a:pPr algn="ctr"/>
+            <a:r>
+              <a:rPr lang="en-US" dirty="0"/>
+              <a:t>🕓 03:00 P.M.</a:t>
+            </a:r>
           </a:p>
         </p:txBody>
       </p:sp>
@@ -33243,6 +33463,58 @@
           </a:prstGeom>
         </p:spPr>
       </p:pic>
+      <p:sp>
+        <p:nvSpPr>
+          <p:cNvPr id="5" name="Rectangle 4">
+            <a:extLst>
+              <a:ext uri="{FF2B5EF4-FFF2-40B4-BE49-F238E27FC236}">
+                <a16:creationId xmlns:a16="http://schemas.microsoft.com/office/drawing/2014/main" id="{106CEFF9-4794-F9AE-DE0F-E14646D3D772}"/>
+              </a:ext>
+            </a:extLst>
+          </p:cNvPr>
+          <p:cNvSpPr/>
+          <p:nvPr/>
+        </p:nvSpPr>
+        <p:spPr>
+          <a:xfrm>
+            <a:off x="62910" y="136525"/>
+            <a:ext cx="1580539" cy="357745"/>
+          </a:xfrm>
+          <a:prstGeom prst="rect">
+            <a:avLst/>
+          </a:prstGeom>
+          <a:ln>
+            <a:noFill/>
+          </a:ln>
+        </p:spPr>
+        <p:style>
+          <a:lnRef idx="2">
+            <a:schemeClr val="accent5">
+              <a:shade val="15000"/>
+            </a:schemeClr>
+          </a:lnRef>
+          <a:fillRef idx="1">
+            <a:schemeClr val="accent5"/>
+          </a:fillRef>
+          <a:effectRef idx="0">
+            <a:schemeClr val="accent5"/>
+          </a:effectRef>
+          <a:fontRef idx="minor">
+            <a:schemeClr val="lt1"/>
+          </a:fontRef>
+        </p:style>
+        <p:txBody>
+          <a:bodyPr rtlCol="0" anchor="ctr"/>
+          <a:lstStyle/>
+          <a:p>
+            <a:pPr algn="ctr"/>
+            <a:r>
+              <a:rPr lang="en-US" dirty="0"/>
+              <a:t>🕓 03:30 P.M.</a:t>
+            </a:r>
+          </a:p>
+        </p:txBody>
+      </p:sp>
     </p:spTree>
     <p:extLst>
       <p:ext uri="{BB962C8B-B14F-4D97-AF65-F5344CB8AC3E}">
@@ -34810,7 +35082,7 @@
             </a:pPr>
             <a:r>
               <a:rPr lang="en-US" sz="2400" noProof="1"/>
-              <a:t>💖You sent the mail with the status at 03:30 P.M. with all technical details, packed your stuff and leave to prepare for your romantic evening.</a:t>
+              <a:t>⏰You sent the status mail with all technical details, packed your stuff and leave to prepare for your romantic evening.</a:t>
             </a:r>
           </a:p>
           <a:p>
@@ -34868,6 +35140,58 @@
           <a:p>
             <a:pPr lvl="1"/>
             <a:endParaRPr lang="en-US" sz="2400" noProof="1"/>
+          </a:p>
+        </p:txBody>
+      </p:sp>
+      <p:sp>
+        <p:nvSpPr>
+          <p:cNvPr id="3" name="Rectangle 2">
+            <a:extLst>
+              <a:ext uri="{FF2B5EF4-FFF2-40B4-BE49-F238E27FC236}">
+                <a16:creationId xmlns:a16="http://schemas.microsoft.com/office/drawing/2014/main" id="{15755BD8-52B2-29C6-CEC2-C1525AAB65BA}"/>
+              </a:ext>
+            </a:extLst>
+          </p:cNvPr>
+          <p:cNvSpPr/>
+          <p:nvPr/>
+        </p:nvSpPr>
+        <p:spPr>
+          <a:xfrm>
+            <a:off x="62910" y="136525"/>
+            <a:ext cx="1580539" cy="357745"/>
+          </a:xfrm>
+          <a:prstGeom prst="rect">
+            <a:avLst/>
+          </a:prstGeom>
+          <a:ln>
+            <a:noFill/>
+          </a:ln>
+        </p:spPr>
+        <p:style>
+          <a:lnRef idx="2">
+            <a:schemeClr val="accent5">
+              <a:shade val="15000"/>
+            </a:schemeClr>
+          </a:lnRef>
+          <a:fillRef idx="1">
+            <a:schemeClr val="accent5"/>
+          </a:fillRef>
+          <a:effectRef idx="0">
+            <a:schemeClr val="accent5"/>
+          </a:effectRef>
+          <a:fontRef idx="minor">
+            <a:schemeClr val="lt1"/>
+          </a:fontRef>
+        </p:style>
+        <p:txBody>
+          <a:bodyPr rtlCol="0" anchor="ctr"/>
+          <a:lstStyle/>
+          <a:p>
+            <a:pPr algn="ctr"/>
+            <a:r>
+              <a:rPr lang="en-US" dirty="0"/>
+              <a:t>🕓 03:45 P.M.</a:t>
+            </a:r>
           </a:p>
         </p:txBody>
       </p:sp>
@@ -35701,6 +36025,53 @@
           <a:chExt cx="0" cy="0"/>
         </a:xfrm>
       </p:grpSpPr>
+      <p:pic>
+        <p:nvPicPr>
+          <p:cNvPr id="1026" name="Picture 2">
+            <a:extLst>
+              <a:ext uri="{FF2B5EF4-FFF2-40B4-BE49-F238E27FC236}">
+                <a16:creationId xmlns:a16="http://schemas.microsoft.com/office/drawing/2014/main" id="{3C9B8336-B99D-96A4-B5FE-A565EE763009}"/>
+              </a:ext>
+            </a:extLst>
+          </p:cNvPr>
+          <p:cNvPicPr>
+            <a:picLocks noChangeAspect="1" noChangeArrowheads="1"/>
+          </p:cNvPicPr>
+          <p:nvPr/>
+        </p:nvPicPr>
+        <p:blipFill>
+          <a:blip r:embed="rId2">
+            <a:extLst>
+              <a:ext uri="{28A0092B-C50C-407E-A947-70E740481C1C}">
+                <a14:useLocalDpi xmlns:a14="http://schemas.microsoft.com/office/drawing/2010/main" val="0"/>
+              </a:ext>
+            </a:extLst>
+          </a:blip>
+          <a:srcRect/>
+          <a:stretch>
+            <a:fillRect/>
+          </a:stretch>
+        </p:blipFill>
+        <p:spPr bwMode="auto">
+          <a:xfrm>
+            <a:off x="1767090" y="98854"/>
+            <a:ext cx="8714326" cy="5722841"/>
+          </a:xfrm>
+          <a:prstGeom prst="rect">
+            <a:avLst/>
+          </a:prstGeom>
+          <a:noFill/>
+          <a:extLst>
+            <a:ext uri="{909E8E84-426E-40DD-AFC4-6F175D3DCCD1}">
+              <a14:hiddenFill xmlns:a14="http://schemas.microsoft.com/office/drawing/2010/main">
+                <a:solidFill>
+                  <a:srgbClr val="FFFFFF"/>
+                </a:solidFill>
+              </a14:hiddenFill>
+            </a:ext>
+          </a:extLst>
+        </p:spPr>
+      </p:pic>
       <p:sp>
         <p:nvSpPr>
           <p:cNvPr id="2" name="Title 1">
@@ -35719,27 +36090,18 @@
         </p:nvSpPr>
         <p:spPr>
           <a:xfrm>
-            <a:off x="5892799" y="2571235"/>
-            <a:ext cx="6189133" cy="1715531"/>
+            <a:off x="1767090" y="5742259"/>
+            <a:ext cx="8714325" cy="825845"/>
           </a:xfrm>
         </p:spPr>
         <p:txBody>
           <a:bodyPr/>
           <a:lstStyle/>
           <a:p>
-            <a:r>
-              <a:rPr lang="en-US" dirty="0"/>
-              <a:t>🤗Thank you!</a:t>
-            </a:r>
-            <a:br>
-              <a:rPr lang="en-US" dirty="0"/>
-            </a:br>
-            <a:br>
-              <a:rPr lang="en-US" dirty="0"/>
-            </a:br>
-            <a:r>
-              <a:rPr lang="en-US" dirty="0"/>
-              <a:t>🤔Any questions?</a:t>
+            <a:pPr algn="ctr"/>
+            <a:r>
+              <a:rPr lang="en-US" sz="3200" dirty="0"/>
+              <a:t>🤗Thank you! - 🤔Any questions?</a:t>
             </a:r>
           </a:p>
         </p:txBody>
@@ -35779,53 +36141,6 @@
           </a:p>
         </p:txBody>
       </p:sp>
-      <p:pic>
-        <p:nvPicPr>
-          <p:cNvPr id="1026" name="Picture 2">
-            <a:extLst>
-              <a:ext uri="{FF2B5EF4-FFF2-40B4-BE49-F238E27FC236}">
-                <a16:creationId xmlns:a16="http://schemas.microsoft.com/office/drawing/2014/main" id="{3C9B8336-B99D-96A4-B5FE-A565EE763009}"/>
-              </a:ext>
-            </a:extLst>
-          </p:cNvPr>
-          <p:cNvPicPr>
-            <a:picLocks noChangeAspect="1" noChangeArrowheads="1"/>
-          </p:cNvPicPr>
-          <p:nvPr/>
-        </p:nvPicPr>
-        <p:blipFill>
-          <a:blip r:embed="rId2">
-            <a:extLst>
-              <a:ext uri="{28A0092B-C50C-407E-A947-70E740481C1C}">
-                <a14:useLocalDpi xmlns:a14="http://schemas.microsoft.com/office/drawing/2010/main" val="0"/>
-              </a:ext>
-            </a:extLst>
-          </a:blip>
-          <a:srcRect/>
-          <a:stretch>
-            <a:fillRect/>
-          </a:stretch>
-        </p:blipFill>
-        <p:spPr bwMode="auto">
-          <a:xfrm>
-            <a:off x="239472" y="1572683"/>
-            <a:ext cx="5653327" cy="3712633"/>
-          </a:xfrm>
-          <a:prstGeom prst="rect">
-            <a:avLst/>
-          </a:prstGeom>
-          <a:noFill/>
-          <a:extLst>
-            <a:ext uri="{909E8E84-426E-40DD-AFC4-6F175D3DCCD1}">
-              <a14:hiddenFill xmlns:a14="http://schemas.microsoft.com/office/drawing/2010/main">
-                <a:solidFill>
-                  <a:srgbClr val="FFFFFF"/>
-                </a:solidFill>
-              </a14:hiddenFill>
-            </a:ext>
-          </a:extLst>
-        </p:spPr>
-      </p:pic>
     </p:spTree>
     <p:extLst>
       <p:ext uri="{BB962C8B-B14F-4D97-AF65-F5344CB8AC3E}">
@@ -37849,26 +38164,6 @@
 </file>
 
 <file path=customXml/item1.xml><?xml version="1.0" encoding="utf-8"?>
-<p:properties xmlns:p="http://schemas.microsoft.com/office/2006/metadata/properties" xmlns:xsi="http://www.w3.org/2001/XMLSchema-instance" xmlns:pc="http://schemas.microsoft.com/office/infopath/2007/PartnerControls">
-  <documentManagement>
-    <_ip_UnifiedCompliancePolicyUIAction xmlns="http://schemas.microsoft.com/sharepoint/v3" xsi:nil="true"/>
-    <Image xmlns="71af3243-3dd4-4a8d-8c0d-dd76da1f02a5">
-      <Url xsi:nil="true"/>
-      <Description xsi:nil="true"/>
-    </Image>
-    <Status xmlns="71af3243-3dd4-4a8d-8c0d-dd76da1f02a5">Not started</Status>
-    <Background xmlns="71af3243-3dd4-4a8d-8c0d-dd76da1f02a5">false</Background>
-    <_ip_UnifiedCompliancePolicyProperties xmlns="http://schemas.microsoft.com/sharepoint/v3" xsi:nil="true"/>
-    <ImageTagsTaxHTField xmlns="71af3243-3dd4-4a8d-8c0d-dd76da1f02a5">
-      <Terms xmlns="http://schemas.microsoft.com/office/infopath/2007/PartnerControls"/>
-    </ImageTagsTaxHTField>
-    <TaxCatchAll xmlns="230e9df3-be65-4c73-a93b-d1236ebd677e" xsi:nil="true"/>
-    <MediaServiceKeyPoints xmlns="71af3243-3dd4-4a8d-8c0d-dd76da1f02a5" xsi:nil="true"/>
-  </documentManagement>
-</p:properties>
-</file>
-
-<file path=customXml/item2.xml><?xml version="1.0" encoding="utf-8"?>
 <ct:contentTypeSchema xmlns:ct="http://schemas.microsoft.com/office/2006/metadata/contentType" xmlns:ma="http://schemas.microsoft.com/office/2006/metadata/properties/metaAttributes" ct:_="" ma:_="" ma:contentTypeName="Document" ma:contentTypeID="0x01010079F111ED35F8CC479449609E8A0923A6" ma:contentTypeVersion="27" ma:contentTypeDescription="Create a new document." ma:contentTypeScope="" ma:versionID="c6f9a84f66a9c8b9a21755b9ffafb945">
   <xsd:schema xmlns:xsd="http://www.w3.org/2001/XMLSchema" xmlns:xs="http://www.w3.org/2001/XMLSchema" xmlns:p="http://schemas.microsoft.com/office/2006/metadata/properties" xmlns:ns1="http://schemas.microsoft.com/sharepoint/v3" xmlns:ns2="71af3243-3dd4-4a8d-8c0d-dd76da1f02a5" xmlns:ns3="16c05727-aa75-4e4a-9b5f-8a80a1165891" xmlns:ns4="230e9df3-be65-4c73-a93b-d1236ebd677e" targetNamespace="http://schemas.microsoft.com/office/2006/metadata/properties" ma:root="true" ma:fieldsID="27df39e3e7036dff54f89ddd5805ce72" ns1:_="" ns2:_="" ns3:_="" ns4:_="">
     <xsd:import namespace="http://schemas.microsoft.com/sharepoint/v3"/>
@@ -38174,7 +38469,7 @@
 </ct:contentTypeSchema>
 </file>
 
-<file path=customXml/item3.xml><?xml version="1.0" encoding="utf-8"?>
+<file path=customXml/item2.xml><?xml version="1.0" encoding="utf-8"?>
 <?mso-contentType ?>
 <FormTemplates xmlns="http://schemas.microsoft.com/sharepoint/v3/contenttype/forms">
   <Display>DocumentLibraryForm</Display>
@@ -38183,26 +38478,27 @@
 </FormTemplates>
 </file>
 
-<file path=customXml/itemProps1.xml><?xml version="1.0" encoding="utf-8"?>
-<ds:datastoreItem xmlns:ds="http://schemas.openxmlformats.org/officeDocument/2006/customXml" ds:itemID="{BEFFFA3F-0FB5-4ED3-8906-A15B16577F44}">
-  <ds:schemaRefs>
-    <ds:schemaRef ds:uri="http://schemas.openxmlformats.org/package/2006/metadata/core-properties"/>
-    <ds:schemaRef ds:uri="http://schemas.microsoft.com/office/infopath/2007/PartnerControls"/>
-    <ds:schemaRef ds:uri="http://schemas.microsoft.com/office/2006/documentManagement/types"/>
-    <ds:schemaRef ds:uri="http://purl.org/dc/terms/"/>
-    <ds:schemaRef ds:uri="http://purl.org/dc/dcmitype/"/>
-    <ds:schemaRef ds:uri="http://purl.org/dc/elements/1.1/"/>
-    <ds:schemaRef ds:uri="http://schemas.microsoft.com/sharepoint/v3"/>
-    <ds:schemaRef ds:uri="71af3243-3dd4-4a8d-8c0d-dd76da1f02a5"/>
-    <ds:schemaRef ds:uri="230e9df3-be65-4c73-a93b-d1236ebd677e"/>
-    <ds:schemaRef ds:uri="16c05727-aa75-4e4a-9b5f-8a80a1165891"/>
-    <ds:schemaRef ds:uri="http://schemas.microsoft.com/office/2006/metadata/properties"/>
-    <ds:schemaRef ds:uri="http://www.w3.org/XML/1998/namespace"/>
-  </ds:schemaRefs>
-</ds:datastoreItem>
+<file path=customXml/item3.xml><?xml version="1.0" encoding="utf-8"?>
+<p:properties xmlns:p="http://schemas.microsoft.com/office/2006/metadata/properties" xmlns:xsi="http://www.w3.org/2001/XMLSchema-instance" xmlns:pc="http://schemas.microsoft.com/office/infopath/2007/PartnerControls">
+  <documentManagement>
+    <_ip_UnifiedCompliancePolicyUIAction xmlns="http://schemas.microsoft.com/sharepoint/v3" xsi:nil="true"/>
+    <Image xmlns="71af3243-3dd4-4a8d-8c0d-dd76da1f02a5">
+      <Url xsi:nil="true"/>
+      <Description xsi:nil="true"/>
+    </Image>
+    <Status xmlns="71af3243-3dd4-4a8d-8c0d-dd76da1f02a5">Not started</Status>
+    <Background xmlns="71af3243-3dd4-4a8d-8c0d-dd76da1f02a5">false</Background>
+    <_ip_UnifiedCompliancePolicyProperties xmlns="http://schemas.microsoft.com/sharepoint/v3" xsi:nil="true"/>
+    <ImageTagsTaxHTField xmlns="71af3243-3dd4-4a8d-8c0d-dd76da1f02a5">
+      <Terms xmlns="http://schemas.microsoft.com/office/infopath/2007/PartnerControls"/>
+    </ImageTagsTaxHTField>
+    <TaxCatchAll xmlns="230e9df3-be65-4c73-a93b-d1236ebd677e" xsi:nil="true"/>
+    <MediaServiceKeyPoints xmlns="71af3243-3dd4-4a8d-8c0d-dd76da1f02a5" xsi:nil="true"/>
+  </documentManagement>
+</p:properties>
 </file>
 
-<file path=customXml/itemProps2.xml><?xml version="1.0" encoding="utf-8"?>
+<file path=customXml/itemProps1.xml><?xml version="1.0" encoding="utf-8"?>
 <ds:datastoreItem xmlns:ds="http://schemas.openxmlformats.org/officeDocument/2006/customXml" ds:itemID="{4E18436D-DA32-4E27-AC64-8FFEDA5218F9}">
   <ds:schemaRefs>
     <ds:schemaRef ds:uri="http://schemas.microsoft.com/office/2006/metadata/contentType"/>
@@ -38223,7 +38519,7 @@
 </ds:datastoreItem>
 </file>
 
-<file path=customXml/itemProps3.xml><?xml version="1.0" encoding="utf-8"?>
+<file path=customXml/itemProps2.xml><?xml version="1.0" encoding="utf-8"?>
 <ds:datastoreItem xmlns:ds="http://schemas.openxmlformats.org/officeDocument/2006/customXml" ds:itemID="{6966C46A-DC57-4209-80CD-9FE6C93151FF}">
   <ds:schemaRefs>
     <ds:schemaRef ds:uri="http://schemas.microsoft.com/sharepoint/v3/contenttype/forms"/>
@@ -38231,6 +38527,25 @@
 </ds:datastoreItem>
 </file>
 
+<file path=customXml/itemProps3.xml><?xml version="1.0" encoding="utf-8"?>
+<ds:datastoreItem xmlns:ds="http://schemas.openxmlformats.org/officeDocument/2006/customXml" ds:itemID="{BEFFFA3F-0FB5-4ED3-8906-A15B16577F44}">
+  <ds:schemaRefs>
+    <ds:schemaRef ds:uri="http://schemas.openxmlformats.org/package/2006/metadata/core-properties"/>
+    <ds:schemaRef ds:uri="http://schemas.microsoft.com/office/infopath/2007/PartnerControls"/>
+    <ds:schemaRef ds:uri="http://schemas.microsoft.com/office/2006/documentManagement/types"/>
+    <ds:schemaRef ds:uri="http://purl.org/dc/terms/"/>
+    <ds:schemaRef ds:uri="http://purl.org/dc/dcmitype/"/>
+    <ds:schemaRef ds:uri="http://purl.org/dc/elements/1.1/"/>
+    <ds:schemaRef ds:uri="http://schemas.microsoft.com/sharepoint/v3"/>
+    <ds:schemaRef ds:uri="71af3243-3dd4-4a8d-8c0d-dd76da1f02a5"/>
+    <ds:schemaRef ds:uri="230e9df3-be65-4c73-a93b-d1236ebd677e"/>
+    <ds:schemaRef ds:uri="16c05727-aa75-4e4a-9b5f-8a80a1165891"/>
+    <ds:schemaRef ds:uri="http://schemas.microsoft.com/office/2006/metadata/properties"/>
+    <ds:schemaRef ds:uri="http://www.w3.org/XML/1998/namespace"/>
+  </ds:schemaRefs>
+</ds:datastoreItem>
+</file>
+
 <file path=docMetadata/LabelInfo.xml><?xml version="1.0" encoding="utf-8"?>
 <clbl:labelList xmlns:clbl="http://schemas.microsoft.com/office/2020/mipLabelMetadata"/>
 </file>
</xml_diff>

<commit_message>
Final dry run :)
</commit_message>
<xml_diff>
--- a/presentation.pptx
+++ b/presentation.pptx
@@ -197,7 +197,7 @@
 <file path=ppt/revisionInfo.xml><?xml version="1.0" encoding="utf-8"?>
 <p1510:revInfo xmlns:a="http://schemas.openxmlformats.org/drawingml/2006/main" xmlns:r="http://schemas.openxmlformats.org/officeDocument/2006/relationships" xmlns:p1510="http://schemas.microsoft.com/office/powerpoint/2015/10/main">
   <p1510:revLst>
-    <p1510:client id="{1670CD84-DEE0-4E12-BF01-4C2D0C1D7F30}" v="867" dt="2024-06-14T14:10:26.656"/>
+    <p1510:client id="{1670CD84-DEE0-4E12-BF01-4C2D0C1D7F30}" v="868" dt="2024-06-18T17:35:33.343"/>
   </p1510:revLst>
 </p1510:revInfo>
 </file>
@@ -207,7 +207,7 @@
   <pc:docChgLst>
     <pc:chgData name="Dominique RIGHETTO" userId="512fe077-82ad-424c-88a3-15e852b5861d" providerId="ADAL" clId="{1670CD84-DEE0-4E12-BF01-4C2D0C1D7F30}"/>
     <pc:docChg chg="undo custSel addSld delSld modSld sldOrd">
-      <pc:chgData name="Dominique RIGHETTO" userId="512fe077-82ad-424c-88a3-15e852b5861d" providerId="ADAL" clId="{1670CD84-DEE0-4E12-BF01-4C2D0C1D7F30}" dt="2024-06-14T14:10:31.892" v="12217" actId="14100"/>
+      <pc:chgData name="Dominique RIGHETTO" userId="512fe077-82ad-424c-88a3-15e852b5861d" providerId="ADAL" clId="{1670CD84-DEE0-4E12-BF01-4C2D0C1D7F30}" dt="2024-06-18T17:36:51.405" v="12236"/>
       <pc:docMkLst>
         <pc:docMk/>
       </pc:docMkLst>
@@ -732,7 +732,7 @@
         </pc:picChg>
       </pc:sldChg>
       <pc:sldChg chg="addSp delSp modSp add mod modTransition modAnim">
-        <pc:chgData name="Dominique RIGHETTO" userId="512fe077-82ad-424c-88a3-15e852b5861d" providerId="ADAL" clId="{1670CD84-DEE0-4E12-BF01-4C2D0C1D7F30}" dt="2024-05-12T09:56:30.228" v="10979"/>
+        <pc:chgData name="Dominique RIGHETTO" userId="512fe077-82ad-424c-88a3-15e852b5861d" providerId="ADAL" clId="{1670CD84-DEE0-4E12-BF01-4C2D0C1D7F30}" dt="2024-06-18T17:36:11.240" v="12226"/>
         <pc:sldMkLst>
           <pc:docMk/>
           <pc:sldMk cId="4159186112" sldId="273"/>
@@ -762,7 +762,7 @@
           </ac:spMkLst>
         </pc:spChg>
         <pc:spChg chg="mod ord">
-          <ac:chgData name="Dominique RIGHETTO" userId="512fe077-82ad-424c-88a3-15e852b5861d" providerId="ADAL" clId="{1670CD84-DEE0-4E12-BF01-4C2D0C1D7F30}" dt="2024-05-09T08:45:55.152" v="4247" actId="6549"/>
+          <ac:chgData name="Dominique RIGHETTO" userId="512fe077-82ad-424c-88a3-15e852b5861d" providerId="ADAL" clId="{1670CD84-DEE0-4E12-BF01-4C2D0C1D7F30}" dt="2024-06-18T17:36:11.240" v="12226"/>
           <ac:spMkLst>
             <pc:docMk/>
             <pc:sldMk cId="4159186112" sldId="273"/>
@@ -936,7 +936,7 @@
         </pc:spChg>
       </pc:sldChg>
       <pc:sldChg chg="addSp modSp add mod ord modTransition">
-        <pc:chgData name="Dominique RIGHETTO" userId="512fe077-82ad-424c-88a3-15e852b5861d" providerId="ADAL" clId="{1670CD84-DEE0-4E12-BF01-4C2D0C1D7F30}" dt="2024-05-20T07:21:56.953" v="11480" actId="692"/>
+        <pc:chgData name="Dominique RIGHETTO" userId="512fe077-82ad-424c-88a3-15e852b5861d" providerId="ADAL" clId="{1670CD84-DEE0-4E12-BF01-4C2D0C1D7F30}" dt="2024-06-18T17:36:25.778" v="12230"/>
         <pc:sldMkLst>
           <pc:docMk/>
           <pc:sldMk cId="390519850" sldId="276"/>
@@ -950,7 +950,7 @@
           </ac:spMkLst>
         </pc:spChg>
         <pc:spChg chg="mod">
-          <ac:chgData name="Dominique RIGHETTO" userId="512fe077-82ad-424c-88a3-15e852b5861d" providerId="ADAL" clId="{1670CD84-DEE0-4E12-BF01-4C2D0C1D7F30}" dt="2024-05-09T08:59:36.757" v="4567" actId="113"/>
+          <ac:chgData name="Dominique RIGHETTO" userId="512fe077-82ad-424c-88a3-15e852b5861d" providerId="ADAL" clId="{1670CD84-DEE0-4E12-BF01-4C2D0C1D7F30}" dt="2024-06-18T17:36:25.778" v="12230"/>
           <ac:spMkLst>
             <pc:docMk/>
             <pc:sldMk cId="390519850" sldId="276"/>
@@ -981,7 +981,7 @@
         </pc:sldMkLst>
       </pc:sldChg>
       <pc:sldChg chg="addSp delSp modSp add mod modTransition">
-        <pc:chgData name="Dominique RIGHETTO" userId="512fe077-82ad-424c-88a3-15e852b5861d" providerId="ADAL" clId="{1670CD84-DEE0-4E12-BF01-4C2D0C1D7F30}" dt="2024-05-20T07:22:08.114" v="11482" actId="692"/>
+        <pc:chgData name="Dominique RIGHETTO" userId="512fe077-82ad-424c-88a3-15e852b5861d" providerId="ADAL" clId="{1670CD84-DEE0-4E12-BF01-4C2D0C1D7F30}" dt="2024-06-18T17:36:36.175" v="12234"/>
         <pc:sldMkLst>
           <pc:docMk/>
           <pc:sldMk cId="3732992385" sldId="277"/>
@@ -995,7 +995,7 @@
           </ac:spMkLst>
         </pc:spChg>
         <pc:spChg chg="add mod">
-          <ac:chgData name="Dominique RIGHETTO" userId="512fe077-82ad-424c-88a3-15e852b5861d" providerId="ADAL" clId="{1670CD84-DEE0-4E12-BF01-4C2D0C1D7F30}" dt="2024-05-09T09:11:34.816" v="4988" actId="113"/>
+          <ac:chgData name="Dominique RIGHETTO" userId="512fe077-82ad-424c-88a3-15e852b5861d" providerId="ADAL" clId="{1670CD84-DEE0-4E12-BF01-4C2D0C1D7F30}" dt="2024-06-18T17:36:36.175" v="12234"/>
           <ac:spMkLst>
             <pc:docMk/>
             <pc:sldMk cId="3732992385" sldId="277"/>
@@ -1143,7 +1143,7 @@
         </pc:spChg>
       </pc:sldChg>
       <pc:sldChg chg="addSp delSp modSp add mod ord modTransition">
-        <pc:chgData name="Dominique RIGHETTO" userId="512fe077-82ad-424c-88a3-15e852b5861d" providerId="ADAL" clId="{1670CD84-DEE0-4E12-BF01-4C2D0C1D7F30}" dt="2024-06-14T14:03:53.427" v="12138" actId="21"/>
+        <pc:chgData name="Dominique RIGHETTO" userId="512fe077-82ad-424c-88a3-15e852b5861d" providerId="ADAL" clId="{1670CD84-DEE0-4E12-BF01-4C2D0C1D7F30}" dt="2024-06-18T17:35:38.081" v="12222" actId="20577"/>
         <pc:sldMkLst>
           <pc:docMk/>
           <pc:sldMk cId="1960651900" sldId="281"/>
@@ -1162,6 +1162,14 @@
             <pc:docMk/>
             <pc:sldMk cId="1960651900" sldId="281"/>
             <ac:spMk id="3" creationId="{17FD2C3B-1381-A17A-4A57-909F02E90E2B}"/>
+          </ac:spMkLst>
+        </pc:spChg>
+        <pc:spChg chg="add mod">
+          <ac:chgData name="Dominique RIGHETTO" userId="512fe077-82ad-424c-88a3-15e852b5861d" providerId="ADAL" clId="{1670CD84-DEE0-4E12-BF01-4C2D0C1D7F30}" dt="2024-06-18T17:35:38.081" v="12222" actId="20577"/>
+          <ac:spMkLst>
+            <pc:docMk/>
+            <pc:sldMk cId="1960651900" sldId="281"/>
+            <ac:spMk id="3" creationId="{E62BD5B4-FE2C-D95B-3C07-10FA1CA799E1}"/>
           </ac:spMkLst>
         </pc:spChg>
         <pc:spChg chg="del">
@@ -1417,7 +1425,7 @@
         </pc:picChg>
       </pc:sldChg>
       <pc:sldChg chg="addSp delSp modSp add mod ord modTransition">
-        <pc:chgData name="Dominique RIGHETTO" userId="512fe077-82ad-424c-88a3-15e852b5861d" providerId="ADAL" clId="{1670CD84-DEE0-4E12-BF01-4C2D0C1D7F30}" dt="2024-06-14T14:03:58.618" v="12139"/>
+        <pc:chgData name="Dominique RIGHETTO" userId="512fe077-82ad-424c-88a3-15e852b5861d" providerId="ADAL" clId="{1670CD84-DEE0-4E12-BF01-4C2D0C1D7F30}" dt="2024-06-18T17:36:51.405" v="12236"/>
         <pc:sldMkLst>
           <pc:docMk/>
           <pc:sldMk cId="27853575" sldId="285"/>
@@ -1447,7 +1455,7 @@
           </ac:spMkLst>
         </pc:spChg>
         <pc:spChg chg="add mod">
-          <ac:chgData name="Dominique RIGHETTO" userId="512fe077-82ad-424c-88a3-15e852b5861d" providerId="ADAL" clId="{1670CD84-DEE0-4E12-BF01-4C2D0C1D7F30}" dt="2024-05-11T06:45:12.971" v="7085" actId="20577"/>
+          <ac:chgData name="Dominique RIGHETTO" userId="512fe077-82ad-424c-88a3-15e852b5861d" providerId="ADAL" clId="{1670CD84-DEE0-4E12-BF01-4C2D0C1D7F30}" dt="2024-06-18T17:36:51.405" v="12236"/>
           <ac:spMkLst>
             <pc:docMk/>
             <pc:sldMk cId="27853575" sldId="285"/>
@@ -6256,7 +6264,7 @@
           <a:p>
             <a:fld id="{F352A77B-D33C-49B3-A83C-450AA2ED72B3}" type="datetimeFigureOut">
               <a:rPr lang="en-US" smtClean="0"/>
-              <a:t>6/14/2024</a:t>
+              <a:t>6/18/2024</a:t>
             </a:fld>
             <a:endParaRPr lang="en-US" dirty="0"/>
           </a:p>
@@ -6433,7 +6441,7 @@
           <a:p>
             <a:fld id="{E38D8F9A-F5CB-4EF8-A859-ED5E107B9763}" type="datetimeFigureOut">
               <a:rPr lang="en-US" smtClean="0"/>
-              <a:t>6/14/2024</a:t>
+              <a:t>6/18/2024</a:t>
             </a:fld>
             <a:endParaRPr lang="en-US" dirty="0"/>
           </a:p>
@@ -23288,7 +23296,7 @@
                 </a:solidFill>
                 <a:latin typeface="Consolas" panose="020B0609020204030204" pitchFamily="49" charset="0"/>
               </a:rPr>
-              <a:t>'self’ </a:t>
+              <a:t>'self' </a:t>
             </a:r>
             <a:r>
               <a:rPr lang="en-US" sz="2400" dirty="0">
@@ -23359,7 +23367,7 @@
                 </a:solidFill>
                 <a:latin typeface="Consolas" panose="020B0609020204030204" pitchFamily="49" charset="0"/>
               </a:rPr>
-              <a:t>'unsafe-inline’ </a:t>
+              <a:t>'unsafe-inline' </a:t>
             </a:r>
             <a:r>
               <a:rPr lang="en-US" sz="2400" dirty="0">
@@ -24619,7 +24627,16 @@
                 </a:solidFill>
                 <a:latin typeface="Consolas" panose="020B0609020204030204" pitchFamily="49" charset="0"/>
               </a:rPr>
-              <a:t>'self’</a:t>
+              <a:t>'self</a:t>
+            </a:r>
+            <a:r>
+              <a:rPr lang="en-US" sz="2400" dirty="0">
+                <a:solidFill>
+                  <a:srgbClr val="7030A0"/>
+                </a:solidFill>
+                <a:latin typeface="Consolas" panose="020B0609020204030204" pitchFamily="49" charset="0"/>
+              </a:rPr>
+              <a:t>'</a:t>
             </a:r>
             <a:r>
               <a:rPr lang="en-US" sz="2400" dirty="0">
@@ -24658,7 +24675,7 @@
                 </a:solidFill>
                 <a:latin typeface="Consolas" panose="020B0609020204030204" pitchFamily="49" charset="0"/>
               </a:rPr>
-              <a:t>'self' 'unsafe-inline’ </a:t>
+              <a:t>'self' 'unsafe-inline' </a:t>
             </a:r>
             <a:r>
               <a:rPr lang="en-US" sz="2400" dirty="0">
@@ -25048,7 +25065,7 @@
                 </a:solidFill>
                 <a:latin typeface="Consolas" panose="020B0609020204030204" pitchFamily="49" charset="0"/>
               </a:rPr>
-              <a:t>'self’</a:t>
+              <a:t>'self'</a:t>
             </a:r>
             <a:r>
               <a:rPr lang="en-US" sz="2400" dirty="0">
@@ -25087,7 +25104,7 @@
                 </a:solidFill>
                 <a:latin typeface="Consolas" panose="020B0609020204030204" pitchFamily="49" charset="0"/>
               </a:rPr>
-              <a:t>'self' 'unsafe-inline’ </a:t>
+              <a:t>'self' 'unsafe-inline' </a:t>
             </a:r>
             <a:r>
               <a:rPr lang="en-US" sz="2400" dirty="0">
@@ -26225,6 +26242,58 @@
           </a:p>
         </p:txBody>
       </p:sp>
+      <p:sp>
+        <p:nvSpPr>
+          <p:cNvPr id="3" name="Rectangle 2">
+            <a:extLst>
+              <a:ext uri="{FF2B5EF4-FFF2-40B4-BE49-F238E27FC236}">
+                <a16:creationId xmlns:a16="http://schemas.microsoft.com/office/drawing/2014/main" id="{E62BD5B4-FE2C-D95B-3C07-10FA1CA799E1}"/>
+              </a:ext>
+            </a:extLst>
+          </p:cNvPr>
+          <p:cNvSpPr/>
+          <p:nvPr/>
+        </p:nvSpPr>
+        <p:spPr>
+          <a:xfrm>
+            <a:off x="62910" y="136525"/>
+            <a:ext cx="1580539" cy="357745"/>
+          </a:xfrm>
+          <a:prstGeom prst="rect">
+            <a:avLst/>
+          </a:prstGeom>
+          <a:ln>
+            <a:noFill/>
+          </a:ln>
+        </p:spPr>
+        <p:style>
+          <a:lnRef idx="2">
+            <a:schemeClr val="accent5">
+              <a:shade val="15000"/>
+            </a:schemeClr>
+          </a:lnRef>
+          <a:fillRef idx="1">
+            <a:schemeClr val="accent5"/>
+          </a:fillRef>
+          <a:effectRef idx="0">
+            <a:schemeClr val="accent5"/>
+          </a:effectRef>
+          <a:fontRef idx="minor">
+            <a:schemeClr val="lt1"/>
+          </a:fontRef>
+        </p:style>
+        <p:txBody>
+          <a:bodyPr rtlCol="0" anchor="ctr"/>
+          <a:lstStyle/>
+          <a:p>
+            <a:pPr algn="ctr"/>
+            <a:r>
+              <a:rPr lang="en-US" dirty="0"/>
+              <a:t>🕓 12:00 P.M.</a:t>
+            </a:r>
+          </a:p>
+        </p:txBody>
+      </p:sp>
     </p:spTree>
     <p:extLst>
       <p:ext uri="{BB962C8B-B14F-4D97-AF65-F5344CB8AC3E}">
@@ -26906,7 +26975,7 @@
               <a:t>src</a:t>
             </a:r>
             <a:r>
-              <a:rPr lang="en-US" sz="2000" dirty="0">
+              <a:rPr lang="en-US" sz="2000">
                 <a:solidFill>
                   <a:schemeClr val="accent6"/>
                 </a:solidFill>
@@ -26915,20 +26984,23 @@
               <a:t> </a:t>
             </a:r>
             <a:r>
-              <a:rPr lang="en-US" sz="2000" dirty="0">
+              <a:rPr lang="en-US" sz="2000">
                 <a:solidFill>
                   <a:srgbClr val="7030A0"/>
                 </a:solidFill>
                 <a:latin typeface="Consolas" panose="020B0609020204030204" pitchFamily="49" charset="0"/>
               </a:rPr>
-              <a:t>'self’</a:t>
-            </a:r>
-            <a:r>
-              <a:rPr lang="en-US" sz="2000" dirty="0">
+              <a:t>'self'</a:t>
+            </a:r>
+            <a:r>
+              <a:rPr lang="en-US" sz="2000">
                 <a:latin typeface="Consolas" panose="020B0609020204030204" pitchFamily="49" charset="0"/>
               </a:rPr>
               <a:t>; </a:t>
             </a:r>
+            <a:endParaRPr lang="en-US" sz="2000" dirty="0">
+              <a:latin typeface="Consolas" panose="020B0609020204030204" pitchFamily="49" charset="0"/>
+            </a:endParaRPr>
           </a:p>
           <a:p>
             <a:r>
@@ -38164,6 +38236,35 @@
 </file>
 
 <file path=customXml/item1.xml><?xml version="1.0" encoding="utf-8"?>
+<?mso-contentType ?>
+<FormTemplates xmlns="http://schemas.microsoft.com/sharepoint/v3/contenttype/forms">
+  <Display>DocumentLibraryForm</Display>
+  <Edit>DocumentLibraryForm</Edit>
+  <New>DocumentLibraryForm</New>
+</FormTemplates>
+</file>
+
+<file path=customXml/item2.xml><?xml version="1.0" encoding="utf-8"?>
+<p:properties xmlns:p="http://schemas.microsoft.com/office/2006/metadata/properties" xmlns:xsi="http://www.w3.org/2001/XMLSchema-instance" xmlns:pc="http://schemas.microsoft.com/office/infopath/2007/PartnerControls">
+  <documentManagement>
+    <_ip_UnifiedCompliancePolicyUIAction xmlns="http://schemas.microsoft.com/sharepoint/v3" xsi:nil="true"/>
+    <Image xmlns="71af3243-3dd4-4a8d-8c0d-dd76da1f02a5">
+      <Url xsi:nil="true"/>
+      <Description xsi:nil="true"/>
+    </Image>
+    <Status xmlns="71af3243-3dd4-4a8d-8c0d-dd76da1f02a5">Not started</Status>
+    <Background xmlns="71af3243-3dd4-4a8d-8c0d-dd76da1f02a5">false</Background>
+    <_ip_UnifiedCompliancePolicyProperties xmlns="http://schemas.microsoft.com/sharepoint/v3" xsi:nil="true"/>
+    <ImageTagsTaxHTField xmlns="71af3243-3dd4-4a8d-8c0d-dd76da1f02a5">
+      <Terms xmlns="http://schemas.microsoft.com/office/infopath/2007/PartnerControls"/>
+    </ImageTagsTaxHTField>
+    <TaxCatchAll xmlns="230e9df3-be65-4c73-a93b-d1236ebd677e" xsi:nil="true"/>
+    <MediaServiceKeyPoints xmlns="71af3243-3dd4-4a8d-8c0d-dd76da1f02a5" xsi:nil="true"/>
+  </documentManagement>
+</p:properties>
+</file>
+
+<file path=customXml/item3.xml><?xml version="1.0" encoding="utf-8"?>
 <ct:contentTypeSchema xmlns:ct="http://schemas.microsoft.com/office/2006/metadata/contentType" xmlns:ma="http://schemas.microsoft.com/office/2006/metadata/properties/metaAttributes" ct:_="" ma:_="" ma:contentTypeName="Document" ma:contentTypeID="0x01010079F111ED35F8CC479449609E8A0923A6" ma:contentTypeVersion="27" ma:contentTypeDescription="Create a new document." ma:contentTypeScope="" ma:versionID="c6f9a84f66a9c8b9a21755b9ffafb945">
   <xsd:schema xmlns:xsd="http://www.w3.org/2001/XMLSchema" xmlns:xs="http://www.w3.org/2001/XMLSchema" xmlns:p="http://schemas.microsoft.com/office/2006/metadata/properties" xmlns:ns1="http://schemas.microsoft.com/sharepoint/v3" xmlns:ns2="71af3243-3dd4-4a8d-8c0d-dd76da1f02a5" xmlns:ns3="16c05727-aa75-4e4a-9b5f-8a80a1165891" xmlns:ns4="230e9df3-be65-4c73-a93b-d1236ebd677e" targetNamespace="http://schemas.microsoft.com/office/2006/metadata/properties" ma:root="true" ma:fieldsID="27df39e3e7036dff54f89ddd5805ce72" ns1:_="" ns2:_="" ns3:_="" ns4:_="">
     <xsd:import namespace="http://schemas.microsoft.com/sharepoint/v3"/>
@@ -38469,36 +38570,34 @@
 </ct:contentTypeSchema>
 </file>
 
-<file path=customXml/item2.xml><?xml version="1.0" encoding="utf-8"?>
-<?mso-contentType ?>
-<FormTemplates xmlns="http://schemas.microsoft.com/sharepoint/v3/contenttype/forms">
-  <Display>DocumentLibraryForm</Display>
-  <Edit>DocumentLibraryForm</Edit>
-  <New>DocumentLibraryForm</New>
-</FormTemplates>
+<file path=customXml/itemProps1.xml><?xml version="1.0" encoding="utf-8"?>
+<ds:datastoreItem xmlns:ds="http://schemas.openxmlformats.org/officeDocument/2006/customXml" ds:itemID="{6966C46A-DC57-4209-80CD-9FE6C93151FF}">
+  <ds:schemaRefs>
+    <ds:schemaRef ds:uri="http://schemas.microsoft.com/sharepoint/v3/contenttype/forms"/>
+  </ds:schemaRefs>
+</ds:datastoreItem>
 </file>
 
-<file path=customXml/item3.xml><?xml version="1.0" encoding="utf-8"?>
-<p:properties xmlns:p="http://schemas.microsoft.com/office/2006/metadata/properties" xmlns:xsi="http://www.w3.org/2001/XMLSchema-instance" xmlns:pc="http://schemas.microsoft.com/office/infopath/2007/PartnerControls">
-  <documentManagement>
-    <_ip_UnifiedCompliancePolicyUIAction xmlns="http://schemas.microsoft.com/sharepoint/v3" xsi:nil="true"/>
-    <Image xmlns="71af3243-3dd4-4a8d-8c0d-dd76da1f02a5">
-      <Url xsi:nil="true"/>
-      <Description xsi:nil="true"/>
-    </Image>
-    <Status xmlns="71af3243-3dd4-4a8d-8c0d-dd76da1f02a5">Not started</Status>
-    <Background xmlns="71af3243-3dd4-4a8d-8c0d-dd76da1f02a5">false</Background>
-    <_ip_UnifiedCompliancePolicyProperties xmlns="http://schemas.microsoft.com/sharepoint/v3" xsi:nil="true"/>
-    <ImageTagsTaxHTField xmlns="71af3243-3dd4-4a8d-8c0d-dd76da1f02a5">
-      <Terms xmlns="http://schemas.microsoft.com/office/infopath/2007/PartnerControls"/>
-    </ImageTagsTaxHTField>
-    <TaxCatchAll xmlns="230e9df3-be65-4c73-a93b-d1236ebd677e" xsi:nil="true"/>
-    <MediaServiceKeyPoints xmlns="71af3243-3dd4-4a8d-8c0d-dd76da1f02a5" xsi:nil="true"/>
-  </documentManagement>
-</p:properties>
+<file path=customXml/itemProps2.xml><?xml version="1.0" encoding="utf-8"?>
+<ds:datastoreItem xmlns:ds="http://schemas.openxmlformats.org/officeDocument/2006/customXml" ds:itemID="{BEFFFA3F-0FB5-4ED3-8906-A15B16577F44}">
+  <ds:schemaRefs>
+    <ds:schemaRef ds:uri="http://schemas.openxmlformats.org/package/2006/metadata/core-properties"/>
+    <ds:schemaRef ds:uri="http://schemas.microsoft.com/office/infopath/2007/PartnerControls"/>
+    <ds:schemaRef ds:uri="http://schemas.microsoft.com/office/2006/documentManagement/types"/>
+    <ds:schemaRef ds:uri="http://purl.org/dc/terms/"/>
+    <ds:schemaRef ds:uri="http://purl.org/dc/dcmitype/"/>
+    <ds:schemaRef ds:uri="http://purl.org/dc/elements/1.1/"/>
+    <ds:schemaRef ds:uri="http://schemas.microsoft.com/sharepoint/v3"/>
+    <ds:schemaRef ds:uri="71af3243-3dd4-4a8d-8c0d-dd76da1f02a5"/>
+    <ds:schemaRef ds:uri="230e9df3-be65-4c73-a93b-d1236ebd677e"/>
+    <ds:schemaRef ds:uri="16c05727-aa75-4e4a-9b5f-8a80a1165891"/>
+    <ds:schemaRef ds:uri="http://schemas.microsoft.com/office/2006/metadata/properties"/>
+    <ds:schemaRef ds:uri="http://www.w3.org/XML/1998/namespace"/>
+  </ds:schemaRefs>
+</ds:datastoreItem>
 </file>
 
-<file path=customXml/itemProps1.xml><?xml version="1.0" encoding="utf-8"?>
+<file path=customXml/itemProps3.xml><?xml version="1.0" encoding="utf-8"?>
 <ds:datastoreItem xmlns:ds="http://schemas.openxmlformats.org/officeDocument/2006/customXml" ds:itemID="{4E18436D-DA32-4E27-AC64-8FFEDA5218F9}">
   <ds:schemaRefs>
     <ds:schemaRef ds:uri="http://schemas.microsoft.com/office/2006/metadata/contentType"/>
@@ -38519,33 +38618,6 @@
 </ds:datastoreItem>
 </file>
 
-<file path=customXml/itemProps2.xml><?xml version="1.0" encoding="utf-8"?>
-<ds:datastoreItem xmlns:ds="http://schemas.openxmlformats.org/officeDocument/2006/customXml" ds:itemID="{6966C46A-DC57-4209-80CD-9FE6C93151FF}">
-  <ds:schemaRefs>
-    <ds:schemaRef ds:uri="http://schemas.microsoft.com/sharepoint/v3/contenttype/forms"/>
-  </ds:schemaRefs>
-</ds:datastoreItem>
-</file>
-
-<file path=customXml/itemProps3.xml><?xml version="1.0" encoding="utf-8"?>
-<ds:datastoreItem xmlns:ds="http://schemas.openxmlformats.org/officeDocument/2006/customXml" ds:itemID="{BEFFFA3F-0FB5-4ED3-8906-A15B16577F44}">
-  <ds:schemaRefs>
-    <ds:schemaRef ds:uri="http://schemas.openxmlformats.org/package/2006/metadata/core-properties"/>
-    <ds:schemaRef ds:uri="http://schemas.microsoft.com/office/infopath/2007/PartnerControls"/>
-    <ds:schemaRef ds:uri="http://schemas.microsoft.com/office/2006/documentManagement/types"/>
-    <ds:schemaRef ds:uri="http://purl.org/dc/terms/"/>
-    <ds:schemaRef ds:uri="http://purl.org/dc/dcmitype/"/>
-    <ds:schemaRef ds:uri="http://purl.org/dc/elements/1.1/"/>
-    <ds:schemaRef ds:uri="http://schemas.microsoft.com/sharepoint/v3"/>
-    <ds:schemaRef ds:uri="71af3243-3dd4-4a8d-8c0d-dd76da1f02a5"/>
-    <ds:schemaRef ds:uri="230e9df3-be65-4c73-a93b-d1236ebd677e"/>
-    <ds:schemaRef ds:uri="16c05727-aa75-4e4a-9b5f-8a80a1165891"/>
-    <ds:schemaRef ds:uri="http://schemas.microsoft.com/office/2006/metadata/properties"/>
-    <ds:schemaRef ds:uri="http://www.w3.org/XML/1998/namespace"/>
-  </ds:schemaRefs>
-</ds:datastoreItem>
-</file>
-
 <file path=docMetadata/LabelInfo.xml><?xml version="1.0" encoding="utf-8"?>
 <clbl:labelList xmlns:clbl="http://schemas.microsoft.com/office/2020/mipLabelMetadata"/>
 </file>
</xml_diff>